<commit_message>
Powerpoint updated with p1 slide
</commit_message>
<xml_diff>
--- a/Machine_Learning/Project/ML_Project_Pres.pptx
+++ b/Machine_Learning/Project/ML_Project_Pres.pptx
@@ -109,6 +109,11 @@
       </a:defRPr>
     </a:lvl9pPr>
   </p:defaultTextStyle>
+  <p:extLst>
+    <p:ext uri="{EFAFB233-063F-42B5-8137-9DF3F51BA10A}">
+      <p15:sldGuideLst xmlns:p15="http://schemas.microsoft.com/office/powerpoint/2012/main"/>
+    </p:ext>
+  </p:extLst>
 </p:presentation>
 </file>
 
@@ -1521,7 +1526,7 @@
           <a:p>
             <a:fld id="{0CE440FF-D211-0F44-B82D-440A268B1D90}" type="datetimeFigureOut">
               <a:rPr lang="en-US" smtClean="0"/>
-              <a:t>12/2/19</a:t>
+              <a:t>12/3/2019</a:t>
             </a:fld>
             <a:endParaRPr lang="en-US"/>
           </a:p>
@@ -2980,7 +2985,7 @@
           <a:p>
             <a:fld id="{0CE440FF-D211-0F44-B82D-440A268B1D90}" type="datetimeFigureOut">
               <a:rPr lang="en-US" smtClean="0"/>
-              <a:t>12/2/19</a:t>
+              <a:t>12/3/2019</a:t>
             </a:fld>
             <a:endParaRPr lang="en-US"/>
           </a:p>
@@ -4433,7 +4438,7 @@
           <a:p>
             <a:fld id="{0CE440FF-D211-0F44-B82D-440A268B1D90}" type="datetimeFigureOut">
               <a:rPr lang="en-US" smtClean="0"/>
-              <a:t>12/2/19</a:t>
+              <a:t>12/3/2019</a:t>
             </a:fld>
             <a:endParaRPr lang="en-US"/>
           </a:p>
@@ -5888,7 +5893,7 @@
           <a:p>
             <a:fld id="{0CE440FF-D211-0F44-B82D-440A268B1D90}" type="datetimeFigureOut">
               <a:rPr lang="en-US" smtClean="0"/>
-              <a:t>12/2/19</a:t>
+              <a:t>12/3/2019</a:t>
             </a:fld>
             <a:endParaRPr lang="en-US"/>
           </a:p>
@@ -7396,7 +7401,7 @@
           <a:p>
             <a:fld id="{0CE440FF-D211-0F44-B82D-440A268B1D90}" type="datetimeFigureOut">
               <a:rPr lang="en-US" smtClean="0"/>
-              <a:t>12/2/19</a:t>
+              <a:t>12/3/2019</a:t>
             </a:fld>
             <a:endParaRPr lang="en-US"/>
           </a:p>
@@ -8917,7 +8922,7 @@
           <a:p>
             <a:fld id="{0CE440FF-D211-0F44-B82D-440A268B1D90}" type="datetimeFigureOut">
               <a:rPr lang="en-US" smtClean="0"/>
-              <a:t>12/2/19</a:t>
+              <a:t>12/3/2019</a:t>
             </a:fld>
             <a:endParaRPr lang="en-US"/>
           </a:p>
@@ -10582,7 +10587,7 @@
           <a:p>
             <a:fld id="{0CE440FF-D211-0F44-B82D-440A268B1D90}" type="datetimeFigureOut">
               <a:rPr lang="en-US" smtClean="0"/>
-              <a:t>12/2/19</a:t>
+              <a:t>12/3/2019</a:t>
             </a:fld>
             <a:endParaRPr lang="en-US"/>
           </a:p>
@@ -11980,7 +11985,7 @@
           <a:p>
             <a:fld id="{0CE440FF-D211-0F44-B82D-440A268B1D90}" type="datetimeFigureOut">
               <a:rPr lang="en-US" smtClean="0"/>
-              <a:t>12/2/19</a:t>
+              <a:t>12/3/2019</a:t>
             </a:fld>
             <a:endParaRPr lang="en-US"/>
           </a:p>
@@ -12080,7 +12085,7 @@
           <a:p>
             <a:fld id="{0CE440FF-D211-0F44-B82D-440A268B1D90}" type="datetimeFigureOut">
               <a:rPr lang="en-US" smtClean="0"/>
-              <a:t>12/2/19</a:t>
+              <a:t>12/3/2019</a:t>
             </a:fld>
             <a:endParaRPr lang="en-US"/>
           </a:p>
@@ -13606,7 +13611,7 @@
           <a:p>
             <a:fld id="{0CE440FF-D211-0F44-B82D-440A268B1D90}" type="datetimeFigureOut">
               <a:rPr lang="en-US" smtClean="0"/>
-              <a:t>12/2/19</a:t>
+              <a:t>12/3/2019</a:t>
             </a:fld>
             <a:endParaRPr lang="en-US"/>
           </a:p>
@@ -15142,7 +15147,7 @@
           <a:p>
             <a:fld id="{0CE440FF-D211-0F44-B82D-440A268B1D90}" type="datetimeFigureOut">
               <a:rPr lang="en-US" smtClean="0"/>
-              <a:t>12/2/19</a:t>
+              <a:t>12/3/2019</a:t>
             </a:fld>
             <a:endParaRPr lang="en-US"/>
           </a:p>
@@ -15365,7 +15370,7 @@
           <a:p>
             <a:fld id="{0CE440FF-D211-0F44-B82D-440A268B1D90}" type="datetimeFigureOut">
               <a:rPr lang="en-US" smtClean="0"/>
-              <a:t>12/2/19</a:t>
+              <a:t>12/3/2019</a:t>
             </a:fld>
             <a:endParaRPr lang="en-US"/>
           </a:p>
@@ -19033,23 +19038,223 @@
         </p:nvSpPr>
         <p:spPr>
           <a:xfrm>
-            <a:off x="807721" y="2635976"/>
-            <a:ext cx="8227269" cy="3542776"/>
+            <a:off x="807721" y="2168577"/>
+            <a:ext cx="8227269" cy="4457075"/>
           </a:xfrm>
         </p:spPr>
         <p:txBody>
           <a:bodyPr>
-            <a:normAutofit/>
+            <a:normAutofit fontScale="92500" lnSpcReduction="20000"/>
           </a:bodyPr>
           <a:lstStyle/>
           <a:p>
             <a:r>
+              <a:rPr lang="en-US" sz="2000" dirty="0"/>
+              <a:t>Process:</a:t>
+            </a:r>
+          </a:p>
+          <a:p>
+            <a:pPr lvl="1"/>
+            <a:r>
+              <a:rPr lang="en-US" sz="1800" dirty="0"/>
+              <a:t>Clean/Preprocess Data Sets</a:t>
+            </a:r>
+          </a:p>
+          <a:p>
+            <a:pPr lvl="1"/>
+            <a:r>
+              <a:rPr lang="en-US" sz="1800" dirty="0"/>
+              <a:t>Used KNN to </a:t>
+            </a:r>
+            <a:r>
+              <a:rPr lang="en-US" sz="1800" dirty="0" err="1"/>
+              <a:t>imputate</a:t>
+            </a:r>
+            <a:r>
+              <a:rPr lang="en-US" sz="1800" dirty="0"/>
+              <a:t> missing/bad data</a:t>
+            </a:r>
+          </a:p>
+          <a:p>
+            <a:pPr lvl="2"/>
+            <a:r>
               <a:rPr lang="en-US" sz="1600" dirty="0"/>
-              <a:t>Definition</a:t>
+              <a:t>Turned bad data into </a:t>
             </a:r>
+            <a:r>
+              <a:rPr lang="en-US" sz="1600" dirty="0" err="1"/>
+              <a:t>NaN</a:t>
+            </a:r>
+            <a:r>
+              <a:rPr lang="en-US" sz="1600" dirty="0"/>
+              <a:t> values, then used fast KNN</a:t>
+            </a:r>
+          </a:p>
+          <a:p>
+            <a:pPr lvl="1"/>
+            <a:r>
+              <a:rPr lang="en-US" sz="1800" dirty="0"/>
+              <a:t>Performed PCA for dimensionality reduction</a:t>
+            </a:r>
+          </a:p>
+          <a:p>
+            <a:pPr lvl="2"/>
+            <a:r>
+              <a:rPr lang="en-US" sz="1600" dirty="0"/>
+              <a:t>E.g. Took training and testing set 1 from 3312 features to 20 most significant features</a:t>
+            </a:r>
+          </a:p>
+          <a:p>
+            <a:pPr lvl="2"/>
+            <a:r>
+              <a:rPr lang="en-US" sz="1600" dirty="0"/>
+              <a:t>Removed columns that didn’t match both sets (down to 15 features)</a:t>
+            </a:r>
+          </a:p>
+          <a:p>
+            <a:pPr lvl="2"/>
+            <a:r>
+              <a:rPr lang="en-US" sz="1600" dirty="0"/>
+              <a:t>Future:  Test for new components c:  20 &gt;= c &gt;= 100, and retrain models for best c values</a:t>
+            </a:r>
+          </a:p>
+          <a:p>
+            <a:pPr lvl="2"/>
+            <a:r>
+              <a:rPr lang="en-US" sz="1600" dirty="0"/>
+              <a:t>Goal:  Reduce features to only most impactful on Y</a:t>
+            </a:r>
+          </a:p>
+          <a:p>
+            <a:pPr lvl="1"/>
+            <a:r>
+              <a:rPr lang="en-US" sz="1800" dirty="0"/>
+              <a:t>Performed KNN (e.g. k = 5 for dataset 1) to predict missing class values</a:t>
+            </a:r>
+          </a:p>
+          <a:p>
+            <a:pPr lvl="1"/>
+            <a:r>
+              <a:rPr lang="en-US" sz="1800" dirty="0"/>
+              <a:t>Trained multiple models using cleaned </a:t>
+            </a:r>
+            <a:r>
+              <a:rPr lang="en-US" sz="1800" dirty="0" err="1"/>
+              <a:t>x_test</a:t>
+            </a:r>
+            <a:r>
+              <a:rPr lang="en-US" sz="1800" dirty="0"/>
+              <a:t> and </a:t>
+            </a:r>
+            <a:r>
+              <a:rPr lang="en-US" sz="1800" dirty="0" err="1"/>
+              <a:t>y_test</a:t>
+            </a:r>
+            <a:endParaRPr lang="en-US" sz="1800" dirty="0"/>
+          </a:p>
+          <a:p>
+            <a:pPr lvl="2"/>
+            <a:r>
+              <a:rPr lang="en-US" sz="1600" dirty="0"/>
+              <a:t>SVM, KNN, Random Forest, Logistic Regression, etc.</a:t>
+            </a:r>
+          </a:p>
+          <a:p>
+            <a:pPr lvl="1"/>
+            <a:endParaRPr lang="en-US" sz="1200" dirty="0"/>
           </a:p>
         </p:txBody>
       </p:sp>
+      <p:pic>
+        <p:nvPicPr>
+          <p:cNvPr id="4" name="Picture 3">
+            <a:extLst>
+              <a:ext uri="{FF2B5EF4-FFF2-40B4-BE49-F238E27FC236}">
+                <a16:creationId xmlns:a16="http://schemas.microsoft.com/office/drawing/2014/main" id="{384AA5D2-7DBD-4A49-8D70-BE724A9692E7}"/>
+              </a:ext>
+            </a:extLst>
+          </p:cNvPr>
+          <p:cNvPicPr>
+            <a:picLocks noChangeAspect="1"/>
+          </p:cNvPicPr>
+          <p:nvPr/>
+        </p:nvPicPr>
+        <p:blipFill>
+          <a:blip r:embed="rId2"/>
+          <a:stretch>
+            <a:fillRect/>
+          </a:stretch>
+        </p:blipFill>
+        <p:spPr>
+          <a:xfrm>
+            <a:off x="8967217" y="3734869"/>
+            <a:ext cx="2909398" cy="822140"/>
+          </a:xfrm>
+          <a:prstGeom prst="rect">
+            <a:avLst/>
+          </a:prstGeom>
+        </p:spPr>
+      </p:pic>
+      <p:pic>
+        <p:nvPicPr>
+          <p:cNvPr id="5" name="Picture 4">
+            <a:extLst>
+              <a:ext uri="{FF2B5EF4-FFF2-40B4-BE49-F238E27FC236}">
+                <a16:creationId xmlns:a16="http://schemas.microsoft.com/office/drawing/2014/main" id="{EEB938F3-71ED-460C-AC33-468152C6499B}"/>
+              </a:ext>
+            </a:extLst>
+          </p:cNvPr>
+          <p:cNvPicPr>
+            <a:picLocks noChangeAspect="1"/>
+          </p:cNvPicPr>
+          <p:nvPr/>
+        </p:nvPicPr>
+        <p:blipFill>
+          <a:blip r:embed="rId3"/>
+          <a:stretch>
+            <a:fillRect/>
+          </a:stretch>
+        </p:blipFill>
+        <p:spPr>
+          <a:xfrm>
+            <a:off x="8964651" y="2358765"/>
+            <a:ext cx="2909398" cy="1189520"/>
+          </a:xfrm>
+          <a:prstGeom prst="rect">
+            <a:avLst/>
+          </a:prstGeom>
+        </p:spPr>
+      </p:pic>
+      <p:pic>
+        <p:nvPicPr>
+          <p:cNvPr id="6" name="Picture 5">
+            <a:extLst>
+              <a:ext uri="{FF2B5EF4-FFF2-40B4-BE49-F238E27FC236}">
+                <a16:creationId xmlns:a16="http://schemas.microsoft.com/office/drawing/2014/main" id="{541F0E9C-72F9-4DCE-B7B0-F08744CE54E3}"/>
+              </a:ext>
+            </a:extLst>
+          </p:cNvPr>
+          <p:cNvPicPr>
+            <a:picLocks noChangeAspect="1"/>
+          </p:cNvPicPr>
+          <p:nvPr/>
+        </p:nvPicPr>
+        <p:blipFill>
+          <a:blip r:embed="rId4"/>
+          <a:stretch>
+            <a:fillRect/>
+          </a:stretch>
+        </p:blipFill>
+        <p:spPr>
+          <a:xfrm>
+            <a:off x="8967216" y="4761291"/>
+            <a:ext cx="2896185" cy="1957938"/>
+          </a:xfrm>
+          <a:prstGeom prst="rect">
+            <a:avLst/>
+          </a:prstGeom>
+        </p:spPr>
+      </p:pic>
     </p:spTree>
     <p:extLst>
       <p:ext uri="{BB962C8B-B14F-4D97-AF65-F5344CB8AC3E}">
@@ -20799,8 +21004,8 @@
         </p:nvSpPr>
         <p:spPr>
           <a:xfrm>
-            <a:off x="807721" y="2635976"/>
-            <a:ext cx="8227269" cy="3542776"/>
+            <a:off x="332376" y="2785636"/>
+            <a:ext cx="8227269" cy="3733878"/>
           </a:xfrm>
         </p:spPr>
         <p:txBody>
@@ -20810,16 +21015,93 @@
           <a:lstStyle/>
           <a:p>
             <a:r>
-              <a:rPr lang="en-US" sz="1600"/>
-              <a:t>Solution approach</a:t>
+              <a:rPr lang="en-US" sz="2800" dirty="0"/>
+              <a:t>Partial results for data set 1:</a:t>
             </a:r>
+          </a:p>
+          <a:p>
+            <a:pPr lvl="1"/>
             <a:r>
-              <a:rPr lang="en-US" sz="1600" dirty="0"/>
-              <a:t>/strategy</a:t>
+              <a:rPr lang="en-US" sz="2400" dirty="0"/>
+              <a:t>Accuracy</a:t>
             </a:r>
+          </a:p>
+          <a:p>
+            <a:pPr lvl="2"/>
+            <a:r>
+              <a:rPr lang="en-US" sz="2000" dirty="0"/>
+              <a:t>Random Forest Classifier = 100%</a:t>
+            </a:r>
+          </a:p>
+          <a:p>
+            <a:pPr lvl="2"/>
+            <a:r>
+              <a:rPr lang="en-US" sz="2000" dirty="0"/>
+              <a:t>Logistic Regression = 90.6%</a:t>
+            </a:r>
+          </a:p>
+          <a:p>
+            <a:pPr lvl="2"/>
+            <a:r>
+              <a:rPr lang="en-US" sz="2000" dirty="0"/>
+              <a:t>SVM (SVC, kernel = linear) = 88.7%</a:t>
+            </a:r>
+          </a:p>
+          <a:p>
+            <a:pPr lvl="2"/>
+            <a:r>
+              <a:rPr lang="en-US" sz="2000" dirty="0"/>
+              <a:t>KNN (k = 5) = 100%</a:t>
+            </a:r>
+          </a:p>
+          <a:p>
+            <a:pPr lvl="2"/>
+            <a:endParaRPr lang="en-US" sz="2000" dirty="0"/>
+          </a:p>
+          <a:p>
+            <a:pPr marL="0" indent="0">
+              <a:buNone/>
+            </a:pPr>
+            <a:endParaRPr lang="en-US" sz="2800" dirty="0"/>
+          </a:p>
+          <a:p>
+            <a:pPr marL="0" indent="0">
+              <a:buNone/>
+            </a:pPr>
+            <a:endParaRPr lang="en-US" sz="2800" dirty="0"/>
           </a:p>
         </p:txBody>
       </p:sp>
+      <p:pic>
+        <p:nvPicPr>
+          <p:cNvPr id="4" name="Picture 3">
+            <a:extLst>
+              <a:ext uri="{FF2B5EF4-FFF2-40B4-BE49-F238E27FC236}">
+                <a16:creationId xmlns:a16="http://schemas.microsoft.com/office/drawing/2014/main" id="{75957D5D-64E1-4FFD-A19E-499CB74D9536}"/>
+              </a:ext>
+            </a:extLst>
+          </p:cNvPr>
+          <p:cNvPicPr>
+            <a:picLocks noChangeAspect="1"/>
+          </p:cNvPicPr>
+          <p:nvPr/>
+        </p:nvPicPr>
+        <p:blipFill>
+          <a:blip r:embed="rId2"/>
+          <a:stretch>
+            <a:fillRect/>
+          </a:stretch>
+        </p:blipFill>
+        <p:spPr>
+          <a:xfrm>
+            <a:off x="6216133" y="2572562"/>
+            <a:ext cx="5156716" cy="3569116"/>
+          </a:xfrm>
+          <a:prstGeom prst="rect">
+            <a:avLst/>
+          </a:prstGeom>
+        </p:spPr>
+      </p:pic>
     </p:spTree>
     <p:extLst>
       <p:ext uri="{BB962C8B-B14F-4D97-AF65-F5344CB8AC3E}">

</xml_diff>